<commit_message>
Statusupdate KW23/24 ohne GM
</commit_message>
<xml_diff>
--- a/Präsentationen/StatusupdateKW23/UpdateKW23.pptx
+++ b/Präsentationen/StatusupdateKW23/UpdateKW23.pptx
@@ -3761,7 +3761,7 @@
           <a:graphicData uri="http://schemas.openxmlformats.org/presentationml/2006/ole">
             <mc:AlternateContent xmlns:mc="http://schemas.openxmlformats.org/markup-compatibility/2006">
               <mc:Choice xmlns:v="urn:schemas-microsoft-com:vml" Requires="v">
-                <p:oleObj spid="_x0000_s11332" name="think-cell Folie" r:id="rId4" imgW="270" imgH="270" progId="TCLayout.ActiveDocument.1">
+                <p:oleObj spid="_x0000_s11334" name="think-cell Folie" r:id="rId4" imgW="270" imgH="270" progId="TCLayout.ActiveDocument.1">
                   <p:embed/>
                 </p:oleObj>
               </mc:Choice>
@@ -6489,7 +6489,7 @@
           <a:graphicData uri="http://schemas.openxmlformats.org/presentationml/2006/ole">
             <mc:AlternateContent xmlns:mc="http://schemas.openxmlformats.org/markup-compatibility/2006">
               <mc:Choice xmlns:v="urn:schemas-microsoft-com:vml" Requires="v">
-                <p:oleObj spid="_x0000_s12356" name="think-cell Folie" r:id="rId4" imgW="270" imgH="270" progId="TCLayout.ActiveDocument.1">
+                <p:oleObj spid="_x0000_s12358" name="think-cell Folie" r:id="rId4" imgW="270" imgH="270" progId="TCLayout.ActiveDocument.1">
                   <p:embed/>
                 </p:oleObj>
               </mc:Choice>
@@ -9867,9 +9867,6 @@
           <a:p>
             <a:endParaRPr lang="de-DE" dirty="0"/>
           </a:p>
-          <a:p>
-            <a:endParaRPr lang="de-DE" dirty="0"/>
-          </a:p>
         </p:txBody>
       </p:sp>
     </p:spTree>
@@ -10728,6 +10725,16 @@
 </file>
 
 <file path=customXml/item1.xml><?xml version="1.0" encoding="utf-8"?>
+<?mso-contentType ?>
+<customXsn xmlns="http://schemas.microsoft.com/office/2006/metadata/customXsn">
+  <xsnLocation/>
+  <cached>True</cached>
+  <openByDefault>True</openByDefault>
+  <xsnScope/>
+</customXsn>
+</file>
+
+<file path=customXml/item2.xml><?xml version="1.0" encoding="utf-8"?>
 <p:properties xmlns:p="http://schemas.microsoft.com/office/2006/metadata/properties" xmlns:xsi="http://www.w3.org/2001/XMLSchema-instance" xmlns:pc="http://schemas.microsoft.com/office/infopath/2007/PartnerControls">
   <documentManagement>
     <n472ea6ee43248479fb8bd9165cf026a xmlns="b85a9d60-6535-41ad-bf5c-23a8b594cd63">
@@ -10759,76 +10766,7 @@
 </p:properties>
 </file>
 
-<file path=customXml/item2.xml><?xml version="1.0" encoding="utf-8"?>
-<?mso-contentType ?>
-<customXsn xmlns="http://schemas.microsoft.com/office/2006/metadata/customXsn">
-  <xsnLocation/>
-  <cached>True</cached>
-  <openByDefault>True</openByDefault>
-  <xsnScope/>
-</customXsn>
-</file>
-
 <file path=customXml/item3.xml><?xml version="1.0" encoding="utf-8"?>
-<?mso-contentType ?>
-<spe:Receivers xmlns:spe="http://schemas.microsoft.com/sharepoint/events">
-  <Receiver>
-    <Name>Document ID Generator</Name>
-    <Synchronization>Synchronous</Synchronization>
-    <Type>10001</Type>
-    <SequenceNumber>1000</SequenceNumber>
-    <Url/>
-    <Assembly>Microsoft.Office.DocumentManagement, Version=15.0.0.0, Culture=neutral, PublicKeyToken=71e9bce111e9429c</Assembly>
-    <Class>Microsoft.Office.DocumentManagement.Internal.DocIdHandler</Class>
-    <Data/>
-    <Filter/>
-  </Receiver>
-  <Receiver>
-    <Name>Document ID Generator</Name>
-    <Synchronization>Synchronous</Synchronization>
-    <Type>10002</Type>
-    <SequenceNumber>1001</SequenceNumber>
-    <Url/>
-    <Assembly>Microsoft.Office.DocumentManagement, Version=15.0.0.0, Culture=neutral, PublicKeyToken=71e9bce111e9429c</Assembly>
-    <Class>Microsoft.Office.DocumentManagement.Internal.DocIdHandler</Class>
-    <Data/>
-    <Filter/>
-  </Receiver>
-  <Receiver>
-    <Name>Document ID Generator</Name>
-    <Synchronization>Synchronous</Synchronization>
-    <Type>10004</Type>
-    <SequenceNumber>1002</SequenceNumber>
-    <Url/>
-    <Assembly>Microsoft.Office.DocumentManagement, Version=15.0.0.0, Culture=neutral, PublicKeyToken=71e9bce111e9429c</Assembly>
-    <Class>Microsoft.Office.DocumentManagement.Internal.DocIdHandler</Class>
-    <Data/>
-    <Filter/>
-  </Receiver>
-  <Receiver>
-    <Name>Document ID Generator</Name>
-    <Synchronization>Synchronous</Synchronization>
-    <Type>10006</Type>
-    <SequenceNumber>1003</SequenceNumber>
-    <Url/>
-    <Assembly>Microsoft.Office.DocumentManagement, Version=15.0.0.0, Culture=neutral, PublicKeyToken=71e9bce111e9429c</Assembly>
-    <Class>Microsoft.Office.DocumentManagement.Internal.DocIdHandler</Class>
-    <Data/>
-    <Filter/>
-  </Receiver>
-</spe:Receivers>
-</file>
-
-<file path=customXml/item4.xml><?xml version="1.0" encoding="utf-8"?>
-<?mso-contentType ?>
-<FormTemplates xmlns="http://schemas.microsoft.com/sharepoint/v3/contenttype/forms">
-  <Display>DocumentLibraryForm</Display>
-  <Edit>DocumentLibraryForm</Edit>
-  <New>DocumentLibraryForm</New>
-</FormTemplates>
-</file>
-
-<file path=customXml/item5.xml><?xml version="1.0" encoding="utf-8"?>
 <ct:contentTypeSchema xmlns:ct="http://schemas.microsoft.com/office/2006/metadata/contentType" xmlns:ma="http://schemas.microsoft.com/office/2006/metadata/properties/metaAttributes" ct:_="" ma:_="" ma:contentTypeName="Dokument" ma:contentTypeID="0x010100ABBD9003812289408EA7333BCACF44FC" ma:contentTypeVersion="12" ma:contentTypeDescription="Ein neues Dokument erstellen." ma:contentTypeScope="" ma:versionID="0c5c1046a88a933084f5a8197ebf6a23">
   <xsd:schema xmlns:xsd="http://www.w3.org/2001/XMLSchema" xmlns:xs="http://www.w3.org/2001/XMLSchema" xmlns:p="http://schemas.microsoft.com/office/2006/metadata/properties" xmlns:ns2="b85a9d60-6535-41ad-bf5c-23a8b594cd63" xmlns:ns3="ed5c7061-1de8-4387-89c6-d21a66c01b33" targetNamespace="http://schemas.microsoft.com/office/2006/metadata/properties" ma:root="true" ma:fieldsID="f2895043163c27cc329504fc8636e150" ns2:_="" ns3:_="">
     <xsd:import namespace="b85a9d60-6535-41ad-bf5c-23a8b594cd63"/>
@@ -11042,7 +10980,74 @@
 </ct:contentTypeSchema>
 </file>
 
+<file path=customXml/item4.xml><?xml version="1.0" encoding="utf-8"?>
+<?mso-contentType ?>
+<FormTemplates xmlns="http://schemas.microsoft.com/sharepoint/v3/contenttype/forms">
+  <Display>DocumentLibraryForm</Display>
+  <Edit>DocumentLibraryForm</Edit>
+  <New>DocumentLibraryForm</New>
+</FormTemplates>
+</file>
+
+<file path=customXml/item5.xml><?xml version="1.0" encoding="utf-8"?>
+<?mso-contentType ?>
+<spe:Receivers xmlns:spe="http://schemas.microsoft.com/sharepoint/events">
+  <Receiver>
+    <Name>Document ID Generator</Name>
+    <Synchronization>Synchronous</Synchronization>
+    <Type>10001</Type>
+    <SequenceNumber>1000</SequenceNumber>
+    <Url/>
+    <Assembly>Microsoft.Office.DocumentManagement, Version=15.0.0.0, Culture=neutral, PublicKeyToken=71e9bce111e9429c</Assembly>
+    <Class>Microsoft.Office.DocumentManagement.Internal.DocIdHandler</Class>
+    <Data/>
+    <Filter/>
+  </Receiver>
+  <Receiver>
+    <Name>Document ID Generator</Name>
+    <Synchronization>Synchronous</Synchronization>
+    <Type>10002</Type>
+    <SequenceNumber>1001</SequenceNumber>
+    <Url/>
+    <Assembly>Microsoft.Office.DocumentManagement, Version=15.0.0.0, Culture=neutral, PublicKeyToken=71e9bce111e9429c</Assembly>
+    <Class>Microsoft.Office.DocumentManagement.Internal.DocIdHandler</Class>
+    <Data/>
+    <Filter/>
+  </Receiver>
+  <Receiver>
+    <Name>Document ID Generator</Name>
+    <Synchronization>Synchronous</Synchronization>
+    <Type>10004</Type>
+    <SequenceNumber>1002</SequenceNumber>
+    <Url/>
+    <Assembly>Microsoft.Office.DocumentManagement, Version=15.0.0.0, Culture=neutral, PublicKeyToken=71e9bce111e9429c</Assembly>
+    <Class>Microsoft.Office.DocumentManagement.Internal.DocIdHandler</Class>
+    <Data/>
+    <Filter/>
+  </Receiver>
+  <Receiver>
+    <Name>Document ID Generator</Name>
+    <Synchronization>Synchronous</Synchronization>
+    <Type>10006</Type>
+    <SequenceNumber>1003</SequenceNumber>
+    <Url/>
+    <Assembly>Microsoft.Office.DocumentManagement, Version=15.0.0.0, Culture=neutral, PublicKeyToken=71e9bce111e9429c</Assembly>
+    <Class>Microsoft.Office.DocumentManagement.Internal.DocIdHandler</Class>
+    <Data/>
+    <Filter/>
+  </Receiver>
+</spe:Receivers>
+</file>
+
 <file path=customXml/itemProps1.xml><?xml version="1.0" encoding="utf-8"?>
+<ds:datastoreItem xmlns:ds="http://schemas.openxmlformats.org/officeDocument/2006/customXml" ds:itemID="{783BD3D0-EE3E-4A15-8667-6519756E537D}">
+  <ds:schemaRefs>
+    <ds:schemaRef ds:uri="http://schemas.microsoft.com/office/2006/metadata/customXsn"/>
+  </ds:schemaRefs>
+</ds:datastoreItem>
+</file>
+
+<file path=customXml/itemProps2.xml><?xml version="1.0" encoding="utf-8"?>
 <ds:datastoreItem xmlns:ds="http://schemas.openxmlformats.org/officeDocument/2006/customXml" ds:itemID="{29940796-2B28-46D6-A019-405D01B8DF60}">
   <ds:schemaRefs>
     <ds:schemaRef ds:uri="http://purl.org/dc/terms/"/>
@@ -11059,31 +11064,7 @@
 </ds:datastoreItem>
 </file>
 
-<file path=customXml/itemProps2.xml><?xml version="1.0" encoding="utf-8"?>
-<ds:datastoreItem xmlns:ds="http://schemas.openxmlformats.org/officeDocument/2006/customXml" ds:itemID="{783BD3D0-EE3E-4A15-8667-6519756E537D}">
-  <ds:schemaRefs>
-    <ds:schemaRef ds:uri="http://schemas.microsoft.com/office/2006/metadata/customXsn"/>
-  </ds:schemaRefs>
-</ds:datastoreItem>
-</file>
-
 <file path=customXml/itemProps3.xml><?xml version="1.0" encoding="utf-8"?>
-<ds:datastoreItem xmlns:ds="http://schemas.openxmlformats.org/officeDocument/2006/customXml" ds:itemID="{0783E0A9-D953-4B7B-BC87-E5F4BA76F061}">
-  <ds:schemaRefs>
-    <ds:schemaRef ds:uri="http://schemas.microsoft.com/sharepoint/events"/>
-  </ds:schemaRefs>
-</ds:datastoreItem>
-</file>
-
-<file path=customXml/itemProps4.xml><?xml version="1.0" encoding="utf-8"?>
-<ds:datastoreItem xmlns:ds="http://schemas.openxmlformats.org/officeDocument/2006/customXml" ds:itemID="{933AE78F-1762-4C8A-B000-A5B2FC0C6AC7}">
-  <ds:schemaRefs>
-    <ds:schemaRef ds:uri="http://schemas.microsoft.com/sharepoint/v3/contenttype/forms"/>
-  </ds:schemaRefs>
-</ds:datastoreItem>
-</file>
-
-<file path=customXml/itemProps5.xml><?xml version="1.0" encoding="utf-8"?>
 <ds:datastoreItem xmlns:ds="http://schemas.openxmlformats.org/officeDocument/2006/customXml" ds:itemID="{ECA8B933-44D9-4902-90F1-BC93213D16AC}">
   <ds:schemaRefs>
     <ds:schemaRef ds:uri="http://schemas.microsoft.com/office/2006/metadata/contentType"/>
@@ -11100,4 +11081,20 @@
     <ds:schemaRef ds:uri="http://schemas.microsoft.com/internal/obd"/>
   </ds:schemaRefs>
 </ds:datastoreItem>
+</file>
+
+<file path=customXml/itemProps4.xml><?xml version="1.0" encoding="utf-8"?>
+<ds:datastoreItem xmlns:ds="http://schemas.openxmlformats.org/officeDocument/2006/customXml" ds:itemID="{933AE78F-1762-4C8A-B000-A5B2FC0C6AC7}">
+  <ds:schemaRefs>
+    <ds:schemaRef ds:uri="http://schemas.microsoft.com/sharepoint/v3/contenttype/forms"/>
+  </ds:schemaRefs>
+</ds:datastoreItem>
+</file>
+
+<file path=customXml/itemProps5.xml><?xml version="1.0" encoding="utf-8"?>
+<ds:datastoreItem xmlns:ds="http://schemas.openxmlformats.org/officeDocument/2006/customXml" ds:itemID="{0783E0A9-D953-4B7B-BC87-E5F4BA76F061}">
+  <ds:schemaRefs>
+    <ds:schemaRef ds:uri="http://schemas.microsoft.com/sharepoint/events"/>
+  </ds:schemaRefs>
+</ds:datastoreItem>
 </file>
</xml_diff>